<commit_message>
finale version layout, diagramme werden evtl noch angepasst
</commit_message>
<xml_diff>
--- a/FST17_M4_PosterHoch_T04_mitBilder.pptx
+++ b/FST17_M4_PosterHoch_T04_mitBilder.pptx
@@ -1193,7 +1193,7 @@
               <a:latin typeface="Arial" panose="020B0604020202020204" pitchFamily="34" charset="0"/>
               <a:cs typeface="Arial" panose="020B0604020202020204" pitchFamily="34" charset="0"/>
             </a:rPr>
-            <a:t>Entwicklung BE FE + </a:t>
+            <a:t>Entwicklung + </a:t>
           </a:r>
           <a:r>
             <a:rPr lang="de-DE" dirty="0" err="1">
@@ -1372,7 +1372,7 @@
       </dgm:t>
     </dgm:pt>
     <dgm:pt modelId="{7CD61C65-77EF-44A7-BACE-471CA21A7869}">
-      <dgm:prSet/>
+      <dgm:prSet custT="1"/>
       <dgm:spPr>
         <a:solidFill>
           <a:srgbClr val="FF9400"/>
@@ -1382,8 +1382,13 @@
         <a:bodyPr/>
         <a:lstStyle/>
         <a:p>
+          <a:pPr>
+            <a:spcAft>
+              <a:spcPct val="35000"/>
+            </a:spcAft>
+          </a:pPr>
           <a:r>
-            <a:rPr lang="de-DE" dirty="0">
+            <a:rPr lang="de-DE" sz="1600" kern="1200" dirty="0">
               <a:latin typeface="Arial" panose="020B0604020202020204" pitchFamily="34" charset="0"/>
               <a:cs typeface="Arial" panose="020B0604020202020204" pitchFamily="34" charset="0"/>
             </a:rPr>
@@ -1391,30 +1396,39 @@
           </a:r>
         </a:p>
         <a:p>
+          <a:pPr>
+            <a:spcAft>
+              <a:spcPct val="35000"/>
+            </a:spcAft>
+          </a:pPr>
           <a:r>
-            <a:rPr lang="de-DE" dirty="0">
+            <a:rPr lang="de-DE" sz="1600" kern="1200" dirty="0">
               <a:latin typeface="Arial" panose="020B0604020202020204" pitchFamily="34" charset="0"/>
               <a:cs typeface="Arial" panose="020B0604020202020204" pitchFamily="34" charset="0"/>
             </a:rPr>
             <a:t>Bis 28.07.</a:t>
           </a:r>
+          <a:endParaRPr lang="de-DE" sz="1600" kern="1200" dirty="0">
+            <a:solidFill>
+              <a:prstClr val="white"/>
+            </a:solidFill>
+            <a:latin typeface="Arial" panose="020B0604020202020204" pitchFamily="34" charset="0"/>
+            <a:ea typeface="+mn-ea"/>
+            <a:cs typeface="Arial" panose="020B0604020202020204" pitchFamily="34" charset="0"/>
+          </a:endParaRPr>
         </a:p>
         <a:p>
+          <a:pPr>
+            <a:spcAft>
+              <a:spcPts val="0"/>
+            </a:spcAft>
+          </a:pPr>
           <a:r>
-            <a:rPr lang="de-DE" dirty="0">
+            <a:rPr lang="de-DE" sz="1600" kern="1200" dirty="0">
               <a:latin typeface="Arial" panose="020B0604020202020204" pitchFamily="34" charset="0"/>
               <a:cs typeface="Arial" panose="020B0604020202020204" pitchFamily="34" charset="0"/>
             </a:rPr>
-            <a:t>Nachbearbeitung</a:t>
-          </a:r>
-        </a:p>
-        <a:p>
-          <a:r>
-            <a:rPr lang="de-DE" dirty="0">
-              <a:latin typeface="Arial" panose="020B0604020202020204" pitchFamily="34" charset="0"/>
-              <a:cs typeface="Arial" panose="020B0604020202020204" pitchFamily="34" charset="0"/>
-            </a:rPr>
-            <a:t>Reflexionsberichte</a:t>
+            <a:t>Portfolioüberblick + Reflexionen</a:t>
           </a:r>
         </a:p>
       </dgm:t>
@@ -1665,12 +1679,12 @@
         </a:fontRef>
       </dsp:style>
       <dsp:txBody>
-        <a:bodyPr spcFirstLastPara="0" vert="horz" wrap="square" lIns="60008" tIns="20003" rIns="20003" bIns="20003" numCol="1" spcCol="1270" anchor="ctr" anchorCtr="0">
+        <a:bodyPr spcFirstLastPara="0" vert="horz" wrap="square" lIns="64008" tIns="21336" rIns="21336" bIns="21336" numCol="1" spcCol="1270" anchor="ctr" anchorCtr="0">
           <a:noAutofit/>
         </a:bodyPr>
         <a:lstStyle/>
         <a:p>
-          <a:pPr marL="0" lvl="0" indent="0" algn="ctr" defTabSz="666750">
+          <a:pPr marL="0" lvl="0" indent="0" algn="ctr" defTabSz="711200">
             <a:lnSpc>
               <a:spcPct val="90000"/>
             </a:lnSpc>
@@ -1683,7 +1697,7 @@
             <a:buNone/>
           </a:pPr>
           <a:r>
-            <a:rPr lang="de-DE" sz="1500" kern="1200" dirty="0">
+            <a:rPr lang="de-DE" sz="1600" kern="1200" dirty="0">
               <a:latin typeface="Arial" panose="020B0604020202020204" pitchFamily="34" charset="0"/>
               <a:cs typeface="Arial" panose="020B0604020202020204" pitchFamily="34" charset="0"/>
             </a:rPr>
@@ -1691,7 +1705,7 @@
           </a:r>
         </a:p>
         <a:p>
-          <a:pPr marL="0" lvl="0" indent="0" algn="ctr" defTabSz="666750">
+          <a:pPr marL="0" lvl="0" indent="0" algn="ctr" defTabSz="711200">
             <a:lnSpc>
               <a:spcPct val="90000"/>
             </a:lnSpc>
@@ -1704,7 +1718,7 @@
             <a:buNone/>
           </a:pPr>
           <a:r>
-            <a:rPr lang="de-DE" sz="1500" kern="1200" dirty="0">
+            <a:rPr lang="de-DE" sz="1600" kern="1200" dirty="0">
               <a:latin typeface="Arial" panose="020B0604020202020204" pitchFamily="34" charset="0"/>
               <a:cs typeface="Arial" panose="020B0604020202020204" pitchFamily="34" charset="0"/>
             </a:rPr>
@@ -1712,7 +1726,7 @@
           </a:r>
         </a:p>
         <a:p>
-          <a:pPr marL="0" lvl="0" indent="0" algn="ctr" defTabSz="666750">
+          <a:pPr marL="0" lvl="0" indent="0" algn="ctr" defTabSz="711200">
             <a:lnSpc>
               <a:spcPct val="90000"/>
             </a:lnSpc>
@@ -1725,7 +1739,7 @@
             <a:buNone/>
           </a:pPr>
           <a:r>
-            <a:rPr lang="de-DE" sz="1500" kern="1200" dirty="0">
+            <a:rPr lang="de-DE" sz="1600" kern="1200" dirty="0">
               <a:latin typeface="Arial" panose="020B0604020202020204" pitchFamily="34" charset="0"/>
               <a:cs typeface="Arial" panose="020B0604020202020204" pitchFamily="34" charset="0"/>
             </a:rPr>
@@ -1782,12 +1796,12 @@
         </a:fontRef>
       </dsp:style>
       <dsp:txBody>
-        <a:bodyPr spcFirstLastPara="0" vert="horz" wrap="square" lIns="60008" tIns="20003" rIns="20003" bIns="20003" numCol="1" spcCol="1270" anchor="ctr" anchorCtr="0">
+        <a:bodyPr spcFirstLastPara="0" vert="horz" wrap="square" lIns="64008" tIns="21336" rIns="21336" bIns="21336" numCol="1" spcCol="1270" anchor="ctr" anchorCtr="0">
           <a:noAutofit/>
         </a:bodyPr>
         <a:lstStyle/>
         <a:p>
-          <a:pPr marL="0" lvl="0" indent="0" algn="ctr" defTabSz="666750">
+          <a:pPr marL="0" lvl="0" indent="0" algn="ctr" defTabSz="711200">
             <a:lnSpc>
               <a:spcPct val="90000"/>
             </a:lnSpc>
@@ -1800,7 +1814,7 @@
             <a:buNone/>
           </a:pPr>
           <a:r>
-            <a:rPr lang="de-DE" sz="1500" kern="1200" dirty="0">
+            <a:rPr lang="de-DE" sz="1600" kern="1200" dirty="0">
               <a:latin typeface="Arial" panose="020B0604020202020204" pitchFamily="34" charset="0"/>
               <a:cs typeface="Arial" panose="020B0604020202020204" pitchFamily="34" charset="0"/>
             </a:rPr>
@@ -1808,7 +1822,7 @@
           </a:r>
         </a:p>
         <a:p>
-          <a:pPr marL="0" lvl="0" indent="0" algn="ctr" defTabSz="666750">
+          <a:pPr marL="0" lvl="0" indent="0" algn="ctr" defTabSz="711200">
             <a:lnSpc>
               <a:spcPct val="90000"/>
             </a:lnSpc>
@@ -1821,7 +1835,7 @@
             <a:buNone/>
           </a:pPr>
           <a:r>
-            <a:rPr lang="de-DE" sz="1500" kern="1200" dirty="0">
+            <a:rPr lang="de-DE" sz="1600" kern="1200" dirty="0">
               <a:latin typeface="Arial" panose="020B0604020202020204" pitchFamily="34" charset="0"/>
               <a:cs typeface="Arial" panose="020B0604020202020204" pitchFamily="34" charset="0"/>
             </a:rPr>
@@ -1829,7 +1843,7 @@
           </a:r>
         </a:p>
         <a:p>
-          <a:pPr marL="0" lvl="0" indent="0" algn="ctr" defTabSz="666750">
+          <a:pPr marL="0" lvl="0" indent="0" algn="ctr" defTabSz="711200">
             <a:lnSpc>
               <a:spcPct val="90000"/>
             </a:lnSpc>
@@ -1842,7 +1856,7 @@
             <a:buNone/>
           </a:pPr>
           <a:r>
-            <a:rPr lang="de-DE" sz="1500" kern="1200" dirty="0">
+            <a:rPr lang="de-DE" sz="1600" kern="1200" dirty="0">
               <a:latin typeface="Arial" panose="020B0604020202020204" pitchFamily="34" charset="0"/>
               <a:cs typeface="Arial" panose="020B0604020202020204" pitchFamily="34" charset="0"/>
             </a:rPr>
@@ -1899,12 +1913,12 @@
         </a:fontRef>
       </dsp:style>
       <dsp:txBody>
-        <a:bodyPr spcFirstLastPara="0" vert="horz" wrap="square" lIns="60008" tIns="20003" rIns="20003" bIns="20003" numCol="1" spcCol="1270" anchor="ctr" anchorCtr="0">
+        <a:bodyPr spcFirstLastPara="0" vert="horz" wrap="square" lIns="64008" tIns="21336" rIns="21336" bIns="21336" numCol="1" spcCol="1270" anchor="ctr" anchorCtr="0">
           <a:noAutofit/>
         </a:bodyPr>
         <a:lstStyle/>
         <a:p>
-          <a:pPr marL="0" lvl="0" indent="0" algn="ctr" defTabSz="666750">
+          <a:pPr marL="0" lvl="0" indent="0" algn="ctr" defTabSz="711200">
             <a:lnSpc>
               <a:spcPct val="90000"/>
             </a:lnSpc>
@@ -1917,7 +1931,7 @@
             <a:buNone/>
           </a:pPr>
           <a:r>
-            <a:rPr lang="de-DE" sz="1500" kern="1200" dirty="0">
+            <a:rPr lang="de-DE" sz="1600" kern="1200" dirty="0">
               <a:latin typeface="Arial" panose="020B0604020202020204" pitchFamily="34" charset="0"/>
               <a:cs typeface="Arial" panose="020B0604020202020204" pitchFamily="34" charset="0"/>
             </a:rPr>
@@ -1925,7 +1939,7 @@
           </a:r>
         </a:p>
         <a:p>
-          <a:pPr marL="0" lvl="0" indent="0" algn="ctr" defTabSz="666750">
+          <a:pPr marL="0" lvl="0" indent="0" algn="ctr" defTabSz="711200">
             <a:lnSpc>
               <a:spcPct val="90000"/>
             </a:lnSpc>
@@ -1938,7 +1952,7 @@
             <a:buNone/>
           </a:pPr>
           <a:r>
-            <a:rPr lang="de-DE" sz="1500" kern="1200" dirty="0">
+            <a:rPr lang="de-DE" sz="1600" kern="1200" dirty="0">
               <a:latin typeface="Arial" panose="020B0604020202020204" pitchFamily="34" charset="0"/>
               <a:cs typeface="Arial" panose="020B0604020202020204" pitchFamily="34" charset="0"/>
             </a:rPr>
@@ -1946,7 +1960,7 @@
           </a:r>
         </a:p>
         <a:p>
-          <a:pPr marL="0" lvl="0" indent="0" algn="ctr" defTabSz="666750">
+          <a:pPr marL="0" lvl="0" indent="0" algn="ctr" defTabSz="711200">
             <a:lnSpc>
               <a:spcPct val="90000"/>
             </a:lnSpc>
@@ -1959,7 +1973,7 @@
             <a:buNone/>
           </a:pPr>
           <a:r>
-            <a:rPr lang="de-DE" sz="1500" kern="1200" dirty="0">
+            <a:rPr lang="de-DE" sz="1600" kern="1200" dirty="0">
               <a:latin typeface="Arial" panose="020B0604020202020204" pitchFamily="34" charset="0"/>
               <a:cs typeface="Arial" panose="020B0604020202020204" pitchFamily="34" charset="0"/>
             </a:rPr>
@@ -2016,12 +2030,12 @@
         </a:fontRef>
       </dsp:style>
       <dsp:txBody>
-        <a:bodyPr spcFirstLastPara="0" vert="horz" wrap="square" lIns="60008" tIns="20003" rIns="20003" bIns="20003" numCol="1" spcCol="1270" anchor="ctr" anchorCtr="0">
+        <a:bodyPr spcFirstLastPara="0" vert="horz" wrap="square" lIns="64008" tIns="21336" rIns="21336" bIns="21336" numCol="1" spcCol="1270" anchor="ctr" anchorCtr="0">
           <a:noAutofit/>
         </a:bodyPr>
         <a:lstStyle/>
         <a:p>
-          <a:pPr marL="0" lvl="0" indent="0" algn="ctr" defTabSz="666750">
+          <a:pPr marL="0" lvl="0" indent="0" algn="ctr" defTabSz="711200">
             <a:lnSpc>
               <a:spcPct val="90000"/>
             </a:lnSpc>
@@ -2034,7 +2048,7 @@
             <a:buNone/>
           </a:pPr>
           <a:r>
-            <a:rPr lang="de-DE" sz="1500" kern="1200" dirty="0">
+            <a:rPr lang="de-DE" sz="1600" kern="1200" dirty="0">
               <a:latin typeface="Arial" panose="020B0604020202020204" pitchFamily="34" charset="0"/>
               <a:cs typeface="Arial" panose="020B0604020202020204" pitchFamily="34" charset="0"/>
             </a:rPr>
@@ -2042,7 +2056,7 @@
           </a:r>
         </a:p>
         <a:p>
-          <a:pPr marL="0" lvl="0" indent="0" algn="ctr" defTabSz="666750">
+          <a:pPr marL="0" lvl="0" indent="0" algn="ctr" defTabSz="711200">
             <a:lnSpc>
               <a:spcPct val="90000"/>
             </a:lnSpc>
@@ -2055,7 +2069,7 @@
             <a:buNone/>
           </a:pPr>
           <a:r>
-            <a:rPr lang="de-DE" sz="1500" kern="1200" dirty="0">
+            <a:rPr lang="de-DE" sz="1600" kern="1200" dirty="0">
               <a:latin typeface="Arial" panose="020B0604020202020204" pitchFamily="34" charset="0"/>
               <a:cs typeface="Arial" panose="020B0604020202020204" pitchFamily="34" charset="0"/>
             </a:rPr>
@@ -2063,7 +2077,7 @@
           </a:r>
         </a:p>
         <a:p>
-          <a:pPr marL="0" lvl="0" indent="0" algn="ctr" defTabSz="666750">
+          <a:pPr marL="0" lvl="0" indent="0" algn="ctr" defTabSz="711200">
             <a:lnSpc>
               <a:spcPct val="90000"/>
             </a:lnSpc>
@@ -2076,7 +2090,7 @@
             <a:buNone/>
           </a:pPr>
           <a:r>
-            <a:rPr lang="de-DE" sz="1500" kern="1200" dirty="0">
+            <a:rPr lang="de-DE" sz="1600" kern="1200" dirty="0">
               <a:latin typeface="Arial" panose="020B0604020202020204" pitchFamily="34" charset="0"/>
               <a:cs typeface="Arial" panose="020B0604020202020204" pitchFamily="34" charset="0"/>
             </a:rPr>
@@ -2133,12 +2147,12 @@
         </a:fontRef>
       </dsp:style>
       <dsp:txBody>
-        <a:bodyPr spcFirstLastPara="0" vert="horz" wrap="square" lIns="60008" tIns="20003" rIns="20003" bIns="20003" numCol="1" spcCol="1270" anchor="ctr" anchorCtr="0">
+        <a:bodyPr spcFirstLastPara="0" vert="horz" wrap="square" lIns="64008" tIns="21336" rIns="21336" bIns="21336" numCol="1" spcCol="1270" anchor="ctr" anchorCtr="0">
           <a:noAutofit/>
         </a:bodyPr>
         <a:lstStyle/>
         <a:p>
-          <a:pPr marL="0" lvl="0" indent="0" algn="ctr" defTabSz="666750">
+          <a:pPr marL="0" lvl="0" indent="0" algn="ctr" defTabSz="711200">
             <a:lnSpc>
               <a:spcPct val="90000"/>
             </a:lnSpc>
@@ -2151,7 +2165,7 @@
             <a:buNone/>
           </a:pPr>
           <a:r>
-            <a:rPr lang="de-DE" sz="1500" kern="1200" dirty="0">
+            <a:rPr lang="de-DE" sz="1600" kern="1200" dirty="0">
               <a:latin typeface="Arial" panose="020B0604020202020204" pitchFamily="34" charset="0"/>
               <a:cs typeface="Arial" panose="020B0604020202020204" pitchFamily="34" charset="0"/>
             </a:rPr>
@@ -2159,7 +2173,7 @@
           </a:r>
         </a:p>
         <a:p>
-          <a:pPr marL="0" lvl="0" indent="0" algn="ctr" defTabSz="666750">
+          <a:pPr marL="0" lvl="0" indent="0" algn="ctr" defTabSz="711200">
             <a:lnSpc>
               <a:spcPct val="90000"/>
             </a:lnSpc>
@@ -2172,7 +2186,7 @@
             <a:buNone/>
           </a:pPr>
           <a:r>
-            <a:rPr lang="de-DE" sz="1500" kern="1200" dirty="0">
+            <a:rPr lang="de-DE" sz="1600" kern="1200" dirty="0">
               <a:latin typeface="Arial" panose="020B0604020202020204" pitchFamily="34" charset="0"/>
               <a:cs typeface="Arial" panose="020B0604020202020204" pitchFamily="34" charset="0"/>
             </a:rPr>
@@ -2180,7 +2194,7 @@
           </a:r>
         </a:p>
         <a:p>
-          <a:pPr marL="0" lvl="0" indent="0" algn="ctr" defTabSz="666750">
+          <a:pPr marL="0" lvl="0" indent="0" algn="ctr" defTabSz="711200">
             <a:lnSpc>
               <a:spcPct val="90000"/>
             </a:lnSpc>
@@ -2193,20 +2207,20 @@
             <a:buNone/>
           </a:pPr>
           <a:r>
-            <a:rPr lang="de-DE" sz="1500" kern="1200" dirty="0">
+            <a:rPr lang="de-DE" sz="1600" kern="1200" dirty="0">
               <a:latin typeface="Arial" panose="020B0604020202020204" pitchFamily="34" charset="0"/>
               <a:cs typeface="Arial" panose="020B0604020202020204" pitchFamily="34" charset="0"/>
             </a:rPr>
-            <a:t>Entwicklung BE FE + </a:t>
+            <a:t>Entwicklung + </a:t>
           </a:r>
           <a:r>
-            <a:rPr lang="de-DE" sz="1500" kern="1200" dirty="0" err="1">
+            <a:rPr lang="de-DE" sz="1600" kern="1200" dirty="0" err="1">
               <a:latin typeface="Arial" panose="020B0604020202020204" pitchFamily="34" charset="0"/>
               <a:cs typeface="Arial" panose="020B0604020202020204" pitchFamily="34" charset="0"/>
             </a:rPr>
             <a:t>Posterentwurf</a:t>
           </a:r>
-          <a:endParaRPr lang="de-DE" sz="1500" kern="1200" dirty="0">
+          <a:endParaRPr lang="de-DE" sz="1600" kern="1200" dirty="0">
             <a:latin typeface="Arial" panose="020B0604020202020204" pitchFamily="34" charset="0"/>
             <a:cs typeface="Arial" panose="020B0604020202020204" pitchFamily="34" charset="0"/>
           </a:endParaRPr>
@@ -2261,12 +2275,12 @@
         </a:fontRef>
       </dsp:style>
       <dsp:txBody>
-        <a:bodyPr spcFirstLastPara="0" vert="horz" wrap="square" lIns="60008" tIns="20003" rIns="20003" bIns="20003" numCol="1" spcCol="1270" anchor="ctr" anchorCtr="0">
+        <a:bodyPr spcFirstLastPara="0" vert="horz" wrap="square" lIns="64008" tIns="21336" rIns="21336" bIns="21336" numCol="1" spcCol="1270" anchor="ctr" anchorCtr="0">
           <a:noAutofit/>
         </a:bodyPr>
         <a:lstStyle/>
         <a:p>
-          <a:pPr marL="0" lvl="0" indent="0" algn="ctr" defTabSz="666750">
+          <a:pPr marL="0" lvl="0" indent="0" algn="ctr" defTabSz="711200">
             <a:lnSpc>
               <a:spcPct val="90000"/>
             </a:lnSpc>
@@ -2279,7 +2293,7 @@
             <a:buNone/>
           </a:pPr>
           <a:r>
-            <a:rPr lang="de-DE" sz="1500" kern="1200" dirty="0">
+            <a:rPr lang="de-DE" sz="1600" kern="1200" dirty="0">
               <a:latin typeface="Arial" panose="020B0604020202020204" pitchFamily="34" charset="0"/>
               <a:cs typeface="Arial" panose="020B0604020202020204" pitchFamily="34" charset="0"/>
             </a:rPr>
@@ -2287,7 +2301,7 @@
           </a:r>
         </a:p>
         <a:p>
-          <a:pPr marL="0" lvl="0" indent="0" algn="ctr" defTabSz="666750">
+          <a:pPr marL="0" lvl="0" indent="0" algn="ctr" defTabSz="711200">
             <a:lnSpc>
               <a:spcPct val="90000"/>
             </a:lnSpc>
@@ -2300,7 +2314,7 @@
             <a:buNone/>
           </a:pPr>
           <a:r>
-            <a:rPr lang="de-DE" sz="1500" kern="1200" dirty="0">
+            <a:rPr lang="de-DE" sz="1600" kern="1200" dirty="0">
               <a:latin typeface="Arial" panose="020B0604020202020204" pitchFamily="34" charset="0"/>
               <a:cs typeface="Arial" panose="020B0604020202020204" pitchFamily="34" charset="0"/>
             </a:rPr>
@@ -2308,7 +2322,7 @@
           </a:r>
         </a:p>
         <a:p>
-          <a:pPr marL="0" lvl="0" indent="0" algn="ctr" defTabSz="666750">
+          <a:pPr marL="0" lvl="0" indent="0" algn="ctr" defTabSz="711200">
             <a:lnSpc>
               <a:spcPct val="90000"/>
             </a:lnSpc>
@@ -2321,7 +2335,7 @@
             <a:buNone/>
           </a:pPr>
           <a:r>
-            <a:rPr lang="de-DE" sz="1500" kern="1200" dirty="0">
+            <a:rPr lang="de-DE" sz="1600" kern="1200" dirty="0">
               <a:latin typeface="Arial" panose="020B0604020202020204" pitchFamily="34" charset="0"/>
               <a:cs typeface="Arial" panose="020B0604020202020204" pitchFamily="34" charset="0"/>
             </a:rPr>
@@ -2378,12 +2392,12 @@
         </a:fontRef>
       </dsp:style>
       <dsp:txBody>
-        <a:bodyPr spcFirstLastPara="0" vert="horz" wrap="square" lIns="60008" tIns="20003" rIns="20003" bIns="20003" numCol="1" spcCol="1270" anchor="ctr" anchorCtr="0">
+        <a:bodyPr spcFirstLastPara="0" vert="horz" wrap="square" lIns="64008" tIns="21336" rIns="21336" bIns="21336" numCol="1" spcCol="1270" anchor="ctr" anchorCtr="0">
           <a:noAutofit/>
         </a:bodyPr>
         <a:lstStyle/>
         <a:p>
-          <a:pPr marL="0" lvl="0" indent="0" algn="ctr" defTabSz="666750">
+          <a:pPr marL="0" lvl="0" indent="0" algn="ctr" defTabSz="711200">
             <a:lnSpc>
               <a:spcPct val="90000"/>
             </a:lnSpc>
@@ -2396,7 +2410,7 @@
             <a:buNone/>
           </a:pPr>
           <a:r>
-            <a:rPr lang="de-DE" sz="1500" kern="1200" dirty="0">
+            <a:rPr lang="de-DE" sz="1600" kern="1200" dirty="0">
               <a:latin typeface="Arial" panose="020B0604020202020204" pitchFamily="34" charset="0"/>
               <a:cs typeface="Arial" panose="020B0604020202020204" pitchFamily="34" charset="0"/>
             </a:rPr>
@@ -2404,7 +2418,7 @@
           </a:r>
         </a:p>
         <a:p>
-          <a:pPr marL="0" lvl="0" indent="0" algn="ctr" defTabSz="666750">
+          <a:pPr marL="0" lvl="0" indent="0" algn="ctr" defTabSz="711200">
             <a:lnSpc>
               <a:spcPct val="90000"/>
             </a:lnSpc>
@@ -2417,7 +2431,7 @@
             <a:buNone/>
           </a:pPr>
           <a:r>
-            <a:rPr lang="de-DE" sz="1500" kern="1200" dirty="0">
+            <a:rPr lang="de-DE" sz="1600" kern="1200" dirty="0">
               <a:latin typeface="Arial" panose="020B0604020202020204" pitchFamily="34" charset="0"/>
               <a:cs typeface="Arial" panose="020B0604020202020204" pitchFamily="34" charset="0"/>
             </a:rPr>
@@ -2425,7 +2439,7 @@
           </a:r>
         </a:p>
         <a:p>
-          <a:pPr marL="0" lvl="0" indent="0" algn="ctr" defTabSz="666750">
+          <a:pPr marL="0" lvl="0" indent="0" algn="ctr" defTabSz="711200">
             <a:lnSpc>
               <a:spcPct val="90000"/>
             </a:lnSpc>
@@ -2438,7 +2452,7 @@
             <a:buNone/>
           </a:pPr>
           <a:r>
-            <a:rPr lang="de-DE" sz="1500" kern="1200" dirty="0">
+            <a:rPr lang="de-DE" sz="1600" kern="1200" dirty="0">
               <a:latin typeface="Arial" panose="020B0604020202020204" pitchFamily="34" charset="0"/>
               <a:cs typeface="Arial" panose="020B0604020202020204" pitchFamily="34" charset="0"/>
             </a:rPr>
@@ -2495,12 +2509,12 @@
         </a:fontRef>
       </dsp:style>
       <dsp:txBody>
-        <a:bodyPr spcFirstLastPara="0" vert="horz" wrap="square" lIns="60008" tIns="20003" rIns="20003" bIns="20003" numCol="1" spcCol="1270" anchor="ctr" anchorCtr="0">
+        <a:bodyPr spcFirstLastPara="0" vert="horz" wrap="square" lIns="64008" tIns="21336" rIns="21336" bIns="21336" numCol="1" spcCol="1270" anchor="ctr" anchorCtr="0">
           <a:noAutofit/>
         </a:bodyPr>
         <a:lstStyle/>
         <a:p>
-          <a:pPr marL="0" lvl="0" indent="0" algn="ctr" defTabSz="666750">
+          <a:pPr marL="0" lvl="0" indent="0" algn="ctr" defTabSz="711200">
             <a:lnSpc>
               <a:spcPct val="90000"/>
             </a:lnSpc>
@@ -2513,7 +2527,7 @@
             <a:buNone/>
           </a:pPr>
           <a:r>
-            <a:rPr lang="de-DE" sz="1500" kern="1200" dirty="0">
+            <a:rPr lang="de-DE" sz="1600" kern="1200" dirty="0">
               <a:latin typeface="Arial" panose="020B0604020202020204" pitchFamily="34" charset="0"/>
               <a:cs typeface="Arial" panose="020B0604020202020204" pitchFamily="34" charset="0"/>
             </a:rPr>
@@ -2521,7 +2535,7 @@
           </a:r>
         </a:p>
         <a:p>
-          <a:pPr marL="0" lvl="0" indent="0" algn="ctr" defTabSz="666750">
+          <a:pPr marL="0" lvl="0" indent="0" algn="ctr" defTabSz="711200">
             <a:lnSpc>
               <a:spcPct val="90000"/>
             </a:lnSpc>
@@ -2534,15 +2548,23 @@
             <a:buNone/>
           </a:pPr>
           <a:r>
-            <a:rPr lang="de-DE" sz="1500" kern="1200" dirty="0">
+            <a:rPr lang="de-DE" sz="1600" kern="1200" dirty="0">
               <a:latin typeface="Arial" panose="020B0604020202020204" pitchFamily="34" charset="0"/>
               <a:cs typeface="Arial" panose="020B0604020202020204" pitchFamily="34" charset="0"/>
             </a:rPr>
             <a:t>Bis 28.07.</a:t>
           </a:r>
+          <a:endParaRPr lang="de-DE" sz="1600" kern="1200" dirty="0">
+            <a:solidFill>
+              <a:prstClr val="white"/>
+            </a:solidFill>
+            <a:latin typeface="Arial" panose="020B0604020202020204" pitchFamily="34" charset="0"/>
+            <a:ea typeface="+mn-ea"/>
+            <a:cs typeface="Arial" panose="020B0604020202020204" pitchFamily="34" charset="0"/>
+          </a:endParaRPr>
         </a:p>
         <a:p>
-          <a:pPr marL="0" lvl="0" indent="0" algn="ctr" defTabSz="666750">
+          <a:pPr marL="0" lvl="0" indent="0" algn="ctr" defTabSz="711200">
             <a:lnSpc>
               <a:spcPct val="90000"/>
             </a:lnSpc>
@@ -2550,37 +2572,16 @@
               <a:spcPct val="0"/>
             </a:spcBef>
             <a:spcAft>
-              <a:spcPct val="35000"/>
+              <a:spcPts val="0"/>
             </a:spcAft>
             <a:buNone/>
           </a:pPr>
           <a:r>
-            <a:rPr lang="de-DE" sz="1500" kern="1200" dirty="0">
+            <a:rPr lang="de-DE" sz="1600" kern="1200" dirty="0">
               <a:latin typeface="Arial" panose="020B0604020202020204" pitchFamily="34" charset="0"/>
               <a:cs typeface="Arial" panose="020B0604020202020204" pitchFamily="34" charset="0"/>
             </a:rPr>
-            <a:t>Nachbearbeitung</a:t>
-          </a:r>
-        </a:p>
-        <a:p>
-          <a:pPr marL="0" lvl="0" indent="0" algn="ctr" defTabSz="666750">
-            <a:lnSpc>
-              <a:spcPct val="90000"/>
-            </a:lnSpc>
-            <a:spcBef>
-              <a:spcPct val="0"/>
-            </a:spcBef>
-            <a:spcAft>
-              <a:spcPct val="35000"/>
-            </a:spcAft>
-            <a:buNone/>
-          </a:pPr>
-          <a:r>
-            <a:rPr lang="de-DE" sz="1500" kern="1200" dirty="0">
-              <a:latin typeface="Arial" panose="020B0604020202020204" pitchFamily="34" charset="0"/>
-              <a:cs typeface="Arial" panose="020B0604020202020204" pitchFamily="34" charset="0"/>
-            </a:rPr>
-            <a:t>Reflexionsberichte</a:t>
+            <a:t>Portfolioüberblick + Reflexionen</a:t>
           </a:r>
         </a:p>
       </dsp:txBody>
@@ -7349,7 +7350,7 @@
         <p:spPr>
           <a:xfrm>
             <a:off x="304333" y="18039231"/>
-            <a:ext cx="6657442" cy="10891249"/>
+            <a:ext cx="6657442" cy="11106586"/>
           </a:xfrm>
           <a:prstGeom prst="rect">
             <a:avLst/>
@@ -7397,7 +7398,7 @@
         <p:spPr>
           <a:xfrm>
             <a:off x="7292447" y="18039230"/>
-            <a:ext cx="13639627" cy="10891249"/>
+            <a:ext cx="13639627" cy="11106587"/>
           </a:xfrm>
           <a:prstGeom prst="rect">
             <a:avLst/>
@@ -7496,8 +7497,8 @@
         </p:nvSpPr>
         <p:spPr>
           <a:xfrm>
-            <a:off x="1692178" y="288083"/>
-            <a:ext cx="18055987" cy="1872207"/>
+            <a:off x="17981689" y="288085"/>
+            <a:ext cx="3224656" cy="504791"/>
           </a:xfrm>
         </p:spPr>
         <p:txBody>
@@ -7508,11 +7509,11 @@
           <a:p>
             <a:pPr algn="l"/>
             <a:r>
-              <a:rPr lang="de-DE" sz="7200" dirty="0">
+              <a:rPr lang="de-DE" sz="2800" dirty="0">
                 <a:latin typeface="Arial" panose="020B0604020202020204" pitchFamily="34" charset="0"/>
                 <a:cs typeface="Arial" panose="020B0604020202020204" pitchFamily="34" charset="0"/>
               </a:rPr>
-              <a:t>Team 4:</a:t>
+              <a:t>Team 4 | Logout</a:t>
             </a:r>
           </a:p>
         </p:txBody>
@@ -7561,8 +7562,8 @@
         </p:nvSpPr>
         <p:spPr>
           <a:xfrm>
-            <a:off x="242216" y="11934024"/>
-            <a:ext cx="19187102" cy="1028647"/>
+            <a:off x="242216" y="11911210"/>
+            <a:ext cx="20689858" cy="1049027"/>
           </a:xfrm>
           <a:prstGeom prst="rect">
             <a:avLst/>
@@ -7583,7 +7584,7 @@
                 <a:latin typeface="Arial" panose="020B0604020202020204" pitchFamily="34" charset="0"/>
                 <a:cs typeface="Arial" panose="020B0604020202020204" pitchFamily="34" charset="0"/>
               </a:rPr>
-              <a:t>Immopiraten</a:t>
+              <a:t>immoPiraten</a:t>
             </a:r>
             <a:r>
               <a:rPr lang="de-DE" b="1" dirty="0">
@@ -7593,7 +7594,7 @@
                 <a:latin typeface="Arial" panose="020B0604020202020204" pitchFamily="34" charset="0"/>
                 <a:cs typeface="Arial" panose="020B0604020202020204" pitchFamily="34" charset="0"/>
               </a:rPr>
-              <a:t> – eine Metasuchmaschine für Immobilien</a:t>
+              <a:t> – Metasuchmaschine für Immobilienanzeigen</a:t>
             </a:r>
           </a:p>
         </p:txBody>
@@ -7606,7 +7607,7 @@
         </p:nvSpPr>
         <p:spPr>
           <a:xfrm>
-            <a:off x="15578835" y="3545231"/>
+            <a:off x="15578835" y="3689247"/>
             <a:ext cx="4187350" cy="5239796"/>
           </a:xfrm>
           <a:prstGeom prst="rect">
@@ -7820,8 +7821,8 @@
         </p:nvSpPr>
         <p:spPr>
           <a:xfrm>
-            <a:off x="7466663" y="24408191"/>
-            <a:ext cx="6466671" cy="369332"/>
+            <a:off x="7466664" y="24545487"/>
+            <a:ext cx="4954706" cy="369332"/>
           </a:xfrm>
           <a:prstGeom prst="rect">
             <a:avLst/>
@@ -7858,7 +7859,7 @@
         </p:nvSpPr>
         <p:spPr>
           <a:xfrm>
-            <a:off x="7459767" y="28531711"/>
+            <a:off x="7459767" y="28675727"/>
             <a:ext cx="5291293" cy="369332"/>
           </a:xfrm>
           <a:prstGeom prst="rect">
@@ -7906,7 +7907,7 @@
         </p:nvSpPr>
         <p:spPr>
           <a:xfrm>
-            <a:off x="13225776" y="24408191"/>
+            <a:off x="13225776" y="24545487"/>
             <a:ext cx="6407027" cy="369332"/>
           </a:xfrm>
           <a:prstGeom prst="rect">
@@ -7996,8 +7997,8 @@
         </p:blipFill>
         <p:spPr>
           <a:xfrm>
-            <a:off x="6019968" y="316733"/>
-            <a:ext cx="9274409" cy="1521003"/>
+            <a:off x="5379852" y="222429"/>
+            <a:ext cx="10482635" cy="1719152"/>
           </a:xfrm>
           <a:prstGeom prst="rect">
             <a:avLst/>
@@ -8026,8 +8027,8 @@
         </p:blipFill>
         <p:spPr>
           <a:xfrm>
-            <a:off x="146104" y="2040347"/>
-            <a:ext cx="20950131" cy="581106"/>
+            <a:off x="146104" y="2167895"/>
+            <a:ext cx="20950131" cy="453558"/>
           </a:xfrm>
           <a:prstGeom prst="rect">
             <a:avLst/>
@@ -8124,7 +8125,13 @@
           <a:lstStyle/>
           <a:p>
             <a:pPr algn="ctr"/>
-            <a:endParaRPr lang="de-DE"/>
+            <a:r>
+              <a:rPr lang="de-DE" dirty="0">
+                <a:hlinkClick r:id="rId5" tooltip="Logo_ImmoScout.png"/>
+              </a:rPr>
+              <a:t>Logo_ImmoScout.png</a:t>
+            </a:r>
+            <a:endParaRPr lang="de-DE" dirty="0"/>
           </a:p>
         </p:txBody>
       </p:sp>
@@ -8137,7 +8144,7 @@
           <p:nvPr/>
         </p:nvPicPr>
         <p:blipFill>
-          <a:blip r:embed="rId5">
+          <a:blip r:embed="rId6">
             <a:extLst>
               <a:ext uri="{28A0092B-C50C-407E-A947-70E740481C1C}">
                 <a14:useLocalDpi xmlns:a14="http://schemas.microsoft.com/office/drawing/2010/main" val="0"/>
@@ -8271,36 +8278,6 @@
           <p:nvPr/>
         </p:nvPicPr>
         <p:blipFill>
-          <a:blip r:embed="rId6" cstate="print">
-            <a:extLst>
-              <a:ext uri="{28A0092B-C50C-407E-A947-70E740481C1C}">
-                <a14:useLocalDpi xmlns:a14="http://schemas.microsoft.com/office/drawing/2010/main" val="0"/>
-              </a:ext>
-            </a:extLst>
-          </a:blip>
-          <a:stretch>
-            <a:fillRect/>
-          </a:stretch>
-        </p:blipFill>
-        <p:spPr>
-          <a:xfrm>
-            <a:off x="429863" y="9813734"/>
-            <a:ext cx="1889493" cy="1281380"/>
-          </a:xfrm>
-          <a:prstGeom prst="rect">
-            <a:avLst/>
-          </a:prstGeom>
-        </p:spPr>
-      </p:pic>
-      <p:pic>
-        <p:nvPicPr>
-          <p:cNvPr id="33" name="Grafik 32"/>
-          <p:cNvPicPr>
-            <a:picLocks noChangeAspect="1"/>
-          </p:cNvPicPr>
-          <p:nvPr/>
-        </p:nvPicPr>
-        <p:blipFill>
           <a:blip r:embed="rId7" cstate="print">
             <a:extLst>
               <a:ext uri="{28A0092B-C50C-407E-A947-70E740481C1C}">
@@ -8314,8 +8291,8 @@
         </p:blipFill>
         <p:spPr>
           <a:xfrm>
-            <a:off x="2447927" y="9816561"/>
-            <a:ext cx="1904300" cy="1291368"/>
+            <a:off x="2052217" y="9813734"/>
+            <a:ext cx="1889493" cy="1281380"/>
           </a:xfrm>
           <a:prstGeom prst="rect">
             <a:avLst/>
@@ -8324,7 +8301,7 @@
       </p:pic>
       <p:pic>
         <p:nvPicPr>
-          <p:cNvPr id="36" name="Grafik 35"/>
+          <p:cNvPr id="33" name="Grafik 32"/>
           <p:cNvPicPr>
             <a:picLocks noChangeAspect="1"/>
           </p:cNvPicPr>
@@ -8344,8 +8321,8 @@
         </p:blipFill>
         <p:spPr>
           <a:xfrm>
-            <a:off x="4480798" y="9817480"/>
-            <a:ext cx="2232248" cy="1255027"/>
+            <a:off x="4167788" y="9816561"/>
+            <a:ext cx="1904300" cy="1291368"/>
           </a:xfrm>
           <a:prstGeom prst="rect">
             <a:avLst/>
@@ -8374,7 +8351,7 @@
         </p:blipFill>
         <p:spPr>
           <a:xfrm>
-            <a:off x="6837255" y="9823574"/>
+            <a:off x="8632308" y="9862578"/>
             <a:ext cx="1475412" cy="1245351"/>
           </a:xfrm>
           <a:prstGeom prst="rect">
@@ -8404,7 +8381,7 @@
         </p:blipFill>
         <p:spPr>
           <a:xfrm>
-            <a:off x="8436876" y="9819500"/>
+            <a:off x="10271705" y="9880291"/>
             <a:ext cx="1746826" cy="1227638"/>
           </a:xfrm>
           <a:prstGeom prst="rect">
@@ -8511,7 +8488,7 @@
         <p:spPr>
           <a:xfrm>
             <a:off x="253901" y="13062629"/>
-            <a:ext cx="3948517" cy="769441"/>
+            <a:ext cx="4804520" cy="1015663"/>
           </a:xfrm>
           <a:prstGeom prst="rect">
             <a:avLst/>
@@ -8525,16 +8502,12 @@
           <a:lstStyle/>
           <a:p>
             <a:r>
-              <a:rPr lang="de-DE" sz="4400" b="1" dirty="0">
+              <a:rPr lang="de-DE" dirty="0">
                 <a:latin typeface="Arial" panose="020B0604020202020204" pitchFamily="34" charset="0"/>
                 <a:cs typeface="Arial" panose="020B0604020202020204" pitchFamily="34" charset="0"/>
               </a:rPr>
               <a:t>Produktvision</a:t>
             </a:r>
-            <a:endParaRPr lang="de-DE" b="1" dirty="0">
-              <a:latin typeface="Arial" panose="020B0604020202020204" pitchFamily="34" charset="0"/>
-              <a:cs typeface="Arial" panose="020B0604020202020204" pitchFamily="34" charset="0"/>
-            </a:endParaRPr>
           </a:p>
         </p:txBody>
       </p:sp>
@@ -8546,7 +8519,7 @@
         </p:nvSpPr>
         <p:spPr>
           <a:xfrm>
-            <a:off x="253901" y="13802289"/>
+            <a:off x="253901" y="13955082"/>
             <a:ext cx="13695989" cy="2246769"/>
           </a:xfrm>
           <a:prstGeom prst="rect">
@@ -8569,7 +8542,7 @@
                 <a:latin typeface="Arial" panose="020B0604020202020204" pitchFamily="34" charset="0"/>
                 <a:cs typeface="Arial" panose="020B0604020202020204" pitchFamily="34" charset="0"/>
               </a:rPr>
-              <a:t>Bündeln von Suchergebnissen verschiedener Quellen auf einem Portal</a:t>
+              <a:t>Aggregieren von Suchergebnissen verschiedener Quellen auf einem Portal</a:t>
             </a:r>
           </a:p>
           <a:p>
@@ -8608,7 +8581,7 @@
                 <a:latin typeface="Arial" panose="020B0604020202020204" pitchFamily="34" charset="0"/>
                 <a:cs typeface="Arial" panose="020B0604020202020204" pitchFamily="34" charset="0"/>
               </a:rPr>
-              <a:t>Benachrichtigung über zum Suchprofil passenden Immobilien</a:t>
+              <a:t>Benachrichtigung über zum Suchprofil passende Immobilien</a:t>
             </a:r>
           </a:p>
           <a:p>
@@ -8621,7 +8594,7 @@
                 <a:latin typeface="Arial" panose="020B0604020202020204" pitchFamily="34" charset="0"/>
                 <a:cs typeface="Arial" panose="020B0604020202020204" pitchFamily="34" charset="0"/>
               </a:rPr>
-              <a:t>Vereinheitlichung der Informationen einer Immobilie (evtl. in einer späteren Phase)</a:t>
+              <a:t>Vereinheitlichung der Informationen einer Immobilie (evtl. in Zukunft)</a:t>
             </a:r>
           </a:p>
         </p:txBody>
@@ -8788,7 +8761,7 @@
         </p:blipFill>
         <p:spPr>
           <a:xfrm>
-            <a:off x="7460878" y="18937798"/>
+            <a:off x="7460878" y="19075094"/>
             <a:ext cx="5391695" cy="5477504"/>
           </a:xfrm>
           <a:prstGeom prst="rect">
@@ -8818,7 +8791,7 @@
         </p:blipFill>
         <p:spPr>
           <a:xfrm>
-            <a:off x="13277837" y="18569853"/>
+            <a:off x="13277837" y="18707149"/>
             <a:ext cx="7491882" cy="5864995"/>
           </a:xfrm>
           <a:prstGeom prst="rect">
@@ -8847,7 +8820,7 @@
         </p:blipFill>
         <p:spPr>
           <a:xfrm>
-            <a:off x="7460878" y="24842811"/>
+            <a:off x="7460878" y="24986827"/>
             <a:ext cx="5205205" cy="3689984"/>
           </a:xfrm>
           <a:prstGeom prst="rect">
@@ -8862,7 +8835,7 @@
           <p:nvPr>
             <p:extLst>
               <p:ext uri="{D42A27DB-BD31-4B8C-83A1-F6EECF244321}">
-                <p14:modId xmlns:p14="http://schemas.microsoft.com/office/powerpoint/2010/main" val="469951144"/>
+                <p14:modId xmlns:p14="http://schemas.microsoft.com/office/powerpoint/2010/main" val="3307415940"/>
               </p:ext>
             </p:extLst>
           </p:nvPr>
@@ -8885,7 +8858,7 @@
         </p:nvSpPr>
         <p:spPr>
           <a:xfrm>
-            <a:off x="14529502" y="9361091"/>
+            <a:off x="14529502" y="9128224"/>
             <a:ext cx="6245607" cy="1384995"/>
           </a:xfrm>
           <a:prstGeom prst="rect">
@@ -8929,7 +8902,7 @@
         <p:spPr>
           <a:xfrm>
             <a:off x="14554005" y="2886038"/>
-            <a:ext cx="4348084" cy="707886"/>
+            <a:ext cx="5500212" cy="984885"/>
           </a:xfrm>
           <a:prstGeom prst="rect">
             <a:avLst/>
@@ -8943,16 +8916,12 @@
           <a:lstStyle/>
           <a:p>
             <a:r>
-              <a:rPr lang="de-DE" sz="4000" b="1" dirty="0">
+              <a:rPr lang="de-DE" dirty="0">
                 <a:latin typeface="Arial" panose="020B0604020202020204" pitchFamily="34" charset="0"/>
                 <a:cs typeface="Arial" panose="020B0604020202020204" pitchFamily="34" charset="0"/>
               </a:rPr>
               <a:t>Teammitglieder</a:t>
             </a:r>
-            <a:endParaRPr lang="de-DE" sz="4400" b="1" dirty="0">
-              <a:latin typeface="Arial" panose="020B0604020202020204" pitchFamily="34" charset="0"/>
-              <a:cs typeface="Arial" panose="020B0604020202020204" pitchFamily="34" charset="0"/>
-            </a:endParaRPr>
           </a:p>
         </p:txBody>
       </p:sp>
@@ -8965,7 +8934,7 @@
         <p:spPr>
           <a:xfrm>
             <a:off x="242216" y="11338559"/>
-            <a:ext cx="13717624" cy="415899"/>
+            <a:ext cx="13707674" cy="415899"/>
           </a:xfrm>
           <a:prstGeom prst="rect">
             <a:avLst/>
@@ -9024,7 +8993,7 @@
         </p:blipFill>
         <p:spPr>
           <a:xfrm>
-            <a:off x="496206" y="27572165"/>
+            <a:off x="496206" y="27777900"/>
             <a:ext cx="953343" cy="953343"/>
           </a:xfrm>
           <a:prstGeom prst="rect">
@@ -9054,7 +9023,7 @@
         </p:blipFill>
         <p:spPr>
           <a:xfrm>
-            <a:off x="3137675" y="27590254"/>
+            <a:off x="3137675" y="27795989"/>
             <a:ext cx="920382" cy="920382"/>
           </a:xfrm>
           <a:prstGeom prst="rect">
@@ -9084,7 +9053,7 @@
         </p:blipFill>
         <p:spPr>
           <a:xfrm>
-            <a:off x="481903" y="24850852"/>
+            <a:off x="481903" y="24957323"/>
             <a:ext cx="4090473" cy="961261"/>
           </a:xfrm>
           <a:prstGeom prst="rect">
@@ -9114,7 +9083,7 @@
         </p:blipFill>
         <p:spPr>
           <a:xfrm>
-            <a:off x="4830574" y="26283080"/>
+            <a:off x="4830574" y="26392190"/>
             <a:ext cx="1984523" cy="826885"/>
           </a:xfrm>
           <a:prstGeom prst="rect">
@@ -9144,7 +9113,7 @@
         </p:blipFill>
         <p:spPr>
           <a:xfrm>
-            <a:off x="472309" y="26282971"/>
+            <a:off x="429863" y="26392189"/>
             <a:ext cx="1577755" cy="826885"/>
           </a:xfrm>
           <a:prstGeom prst="rect">
@@ -9177,7 +9146,7 @@
         </p:blipFill>
         <p:spPr>
           <a:xfrm>
-            <a:off x="2226860" y="26370372"/>
+            <a:off x="2226860" y="26479482"/>
             <a:ext cx="2425112" cy="658660"/>
           </a:xfrm>
           <a:prstGeom prst="rect">
@@ -9207,7 +9176,7 @@
         </p:blipFill>
         <p:spPr>
           <a:xfrm>
-            <a:off x="1842208" y="27589828"/>
+            <a:off x="1842208" y="27795563"/>
             <a:ext cx="902808" cy="902808"/>
           </a:xfrm>
           <a:prstGeom prst="rect">
@@ -9236,7 +9205,7 @@
         </p:blipFill>
         <p:spPr>
           <a:xfrm>
-            <a:off x="4450716" y="27501647"/>
+            <a:off x="4450716" y="27707382"/>
             <a:ext cx="1033571" cy="1008989"/>
           </a:xfrm>
           <a:prstGeom prst="rect">
@@ -9266,7 +9235,7 @@
         </p:blipFill>
         <p:spPr>
           <a:xfrm>
-            <a:off x="4899723" y="24842811"/>
+            <a:off x="4899723" y="24949282"/>
             <a:ext cx="1947298" cy="973649"/>
           </a:xfrm>
           <a:prstGeom prst="rect">
@@ -9295,7 +9264,7 @@
         </p:blipFill>
         <p:spPr>
           <a:xfrm>
-            <a:off x="14642726" y="7157703"/>
+            <a:off x="14642726" y="7301719"/>
             <a:ext cx="692667" cy="800044"/>
           </a:xfrm>
           <a:prstGeom prst="rect">
@@ -9324,7 +9293,7 @@
         </p:blipFill>
         <p:spPr>
           <a:xfrm>
-            <a:off x="14642726" y="6318085"/>
+            <a:off x="14642726" y="6462101"/>
             <a:ext cx="692667" cy="795346"/>
           </a:xfrm>
           <a:prstGeom prst="rect">
@@ -9353,7 +9322,7 @@
         </p:blipFill>
         <p:spPr>
           <a:xfrm>
-            <a:off x="14640626" y="8007009"/>
+            <a:off x="14640626" y="8151025"/>
             <a:ext cx="693362" cy="722798"/>
           </a:xfrm>
           <a:prstGeom prst="rect">
@@ -9382,7 +9351,7 @@
         </p:blipFill>
         <p:spPr>
           <a:xfrm>
-            <a:off x="14655086" y="5444092"/>
+            <a:off x="14655086" y="5588108"/>
             <a:ext cx="674275" cy="832978"/>
           </a:xfrm>
           <a:prstGeom prst="rect">
@@ -9411,7 +9380,7 @@
         </p:blipFill>
         <p:spPr>
           <a:xfrm>
-            <a:off x="14640626" y="3791135"/>
+            <a:off x="14640626" y="3935151"/>
             <a:ext cx="694527" cy="729882"/>
           </a:xfrm>
           <a:prstGeom prst="rect">
@@ -9440,7 +9409,7 @@
         </p:blipFill>
         <p:spPr>
           <a:xfrm>
-            <a:off x="14632403" y="4556442"/>
+            <a:off x="14632403" y="4700458"/>
             <a:ext cx="694527" cy="847317"/>
           </a:xfrm>
           <a:prstGeom prst="rect">
@@ -9470,7 +9439,7 @@
         </p:blipFill>
         <p:spPr>
           <a:xfrm>
-            <a:off x="13277837" y="24842812"/>
+            <a:off x="13277837" y="24986828"/>
             <a:ext cx="7494430" cy="3689984"/>
           </a:xfrm>
           <a:prstGeom prst="rect">
@@ -9486,7 +9455,7 @@
         </p:nvSpPr>
         <p:spPr>
           <a:xfrm>
-            <a:off x="13225776" y="28512956"/>
+            <a:off x="13225776" y="28656972"/>
             <a:ext cx="6668433" cy="369332"/>
           </a:xfrm>
           <a:prstGeom prst="rect">
@@ -9538,8 +9507,202 @@
         </p:blipFill>
         <p:spPr>
           <a:xfrm>
-            <a:off x="5876947" y="27588727"/>
+            <a:off x="5876947" y="27794462"/>
             <a:ext cx="917812" cy="921909"/>
+          </a:xfrm>
+          <a:prstGeom prst="rect">
+            <a:avLst/>
+          </a:prstGeom>
+        </p:spPr>
+      </p:pic>
+      <p:pic>
+        <p:nvPicPr>
+          <p:cNvPr id="52" name="Grafik 51"/>
+          <p:cNvPicPr>
+            <a:picLocks noChangeAspect="1"/>
+          </p:cNvPicPr>
+          <p:nvPr/>
+        </p:nvPicPr>
+        <p:blipFill>
+          <a:blip r:embed="rId41">
+            <a:extLst>
+              <a:ext uri="{28A0092B-C50C-407E-A947-70E740481C1C}">
+                <a14:useLocalDpi xmlns:a14="http://schemas.microsoft.com/office/drawing/2010/main" val="0"/>
+              </a:ext>
+            </a:extLst>
+          </a:blip>
+          <a:stretch>
+            <a:fillRect/>
+          </a:stretch>
+        </p:blipFill>
+        <p:spPr>
+          <a:xfrm>
+            <a:off x="17530451" y="257009"/>
+            <a:ext cx="507542" cy="507542"/>
+          </a:xfrm>
+          <a:prstGeom prst="rect">
+            <a:avLst/>
+          </a:prstGeom>
+        </p:spPr>
+      </p:pic>
+      <p:pic>
+        <p:nvPicPr>
+          <p:cNvPr id="71" name="Grafik 70"/>
+          <p:cNvPicPr>
+            <a:picLocks noChangeAspect="1"/>
+          </p:cNvPicPr>
+          <p:nvPr/>
+        </p:nvPicPr>
+        <p:blipFill>
+          <a:blip r:embed="rId7" cstate="print">
+            <a:extLst>
+              <a:ext uri="{28A0092B-C50C-407E-A947-70E740481C1C}">
+                <a14:useLocalDpi xmlns:a14="http://schemas.microsoft.com/office/drawing/2010/main" val="0"/>
+              </a:ext>
+            </a:extLst>
+          </a:blip>
+          <a:stretch>
+            <a:fillRect/>
+          </a:stretch>
+        </p:blipFill>
+        <p:spPr>
+          <a:xfrm>
+            <a:off x="2114309" y="9826549"/>
+            <a:ext cx="1889493" cy="1281380"/>
+          </a:xfrm>
+          <a:prstGeom prst="rect">
+            <a:avLst/>
+          </a:prstGeom>
+        </p:spPr>
+      </p:pic>
+      <p:pic>
+        <p:nvPicPr>
+          <p:cNvPr id="72" name="Grafik 71"/>
+          <p:cNvPicPr>
+            <a:picLocks noChangeAspect="1"/>
+          </p:cNvPicPr>
+          <p:nvPr/>
+        </p:nvPicPr>
+        <p:blipFill>
+          <a:blip r:embed="rId42" cstate="print">
+            <a:extLst>
+              <a:ext uri="{28A0092B-C50C-407E-A947-70E740481C1C}">
+                <a14:useLocalDpi xmlns:a14="http://schemas.microsoft.com/office/drawing/2010/main" val="0"/>
+              </a:ext>
+            </a:extLst>
+          </a:blip>
+          <a:stretch>
+            <a:fillRect/>
+          </a:stretch>
+        </p:blipFill>
+        <p:spPr>
+          <a:xfrm>
+            <a:off x="6236074" y="9852902"/>
+            <a:ext cx="2232248" cy="1255027"/>
+          </a:xfrm>
+          <a:prstGeom prst="rect">
+            <a:avLst/>
+          </a:prstGeom>
+        </p:spPr>
+      </p:pic>
+      <p:pic>
+        <p:nvPicPr>
+          <p:cNvPr id="1030" name="Picture 6" descr="Logo_Immowelt.png"/>
+          <p:cNvPicPr>
+            <a:picLocks noChangeAspect="1" noChangeArrowheads="1"/>
+          </p:cNvPicPr>
+          <p:nvPr/>
+        </p:nvPicPr>
+        <p:blipFill>
+          <a:blip r:embed="rId43">
+            <a:extLst>
+              <a:ext uri="{28A0092B-C50C-407E-A947-70E740481C1C}">
+                <a14:useLocalDpi xmlns:a14="http://schemas.microsoft.com/office/drawing/2010/main" val="0"/>
+              </a:ext>
+            </a:extLst>
+          </a:blip>
+          <a:srcRect/>
+          <a:stretch>
+            <a:fillRect/>
+          </a:stretch>
+        </p:blipFill>
+        <p:spPr bwMode="auto">
+          <a:xfrm>
+            <a:off x="17931699" y="14679088"/>
+            <a:ext cx="3000375" cy="676275"/>
+          </a:xfrm>
+          <a:prstGeom prst="rect">
+            <a:avLst/>
+          </a:prstGeom>
+          <a:noFill/>
+          <a:extLst>
+            <a:ext uri="{909E8E84-426E-40DD-AFC4-6F175D3DCCD1}">
+              <a14:hiddenFill xmlns:a14="http://schemas.microsoft.com/office/drawing/2010/main">
+                <a:solidFill>
+                  <a:srgbClr val="FFFFFF"/>
+                </a:solidFill>
+              </a14:hiddenFill>
+            </a:ext>
+          </a:extLst>
+        </p:spPr>
+      </p:pic>
+      <p:pic>
+        <p:nvPicPr>
+          <p:cNvPr id="59" name="Grafik 58"/>
+          <p:cNvPicPr>
+            <a:picLocks noChangeAspect="1"/>
+          </p:cNvPicPr>
+          <p:nvPr/>
+        </p:nvPicPr>
+        <p:blipFill>
+          <a:blip r:embed="rId44" cstate="print">
+            <a:extLst>
+              <a:ext uri="{28A0092B-C50C-407E-A947-70E740481C1C}">
+                <a14:useLocalDpi xmlns:a14="http://schemas.microsoft.com/office/drawing/2010/main" val="0"/>
+              </a:ext>
+            </a:extLst>
+          </a:blip>
+          <a:stretch>
+            <a:fillRect/>
+          </a:stretch>
+        </p:blipFill>
+        <p:spPr>
+          <a:xfrm>
+            <a:off x="17931699" y="14023876"/>
+            <a:ext cx="2999781" cy="494495"/>
+          </a:xfrm>
+          <a:prstGeom prst="rect">
+            <a:avLst/>
+          </a:prstGeom>
+        </p:spPr>
+      </p:pic>
+      <p:pic>
+        <p:nvPicPr>
+          <p:cNvPr id="62" name="Grafik 61"/>
+          <p:cNvPicPr>
+            <a:picLocks noChangeAspect="1"/>
+          </p:cNvPicPr>
+          <p:nvPr/>
+        </p:nvPicPr>
+        <p:blipFill>
+          <a:blip r:embed="rId45">
+            <a:extLst>
+              <a:ext uri="{28A0092B-C50C-407E-A947-70E740481C1C}">
+                <a14:useLocalDpi xmlns:a14="http://schemas.microsoft.com/office/drawing/2010/main" val="0"/>
+              </a:ext>
+              <a:ext uri="{96DAC541-7B7A-43D3-8B79-37D633B846F1}">
+                <asvg:svgBlip xmlns:asvg="http://schemas.microsoft.com/office/drawing/2016/SVG/main" r:embed="rId46"/>
+              </a:ext>
+            </a:extLst>
+          </a:blip>
+          <a:stretch>
+            <a:fillRect/>
+          </a:stretch>
+        </p:blipFill>
+        <p:spPr>
+          <a:xfrm>
+            <a:off x="14429479" y="13954682"/>
+            <a:ext cx="2858568" cy="1429285"/>
           </a:xfrm>
           <a:prstGeom prst="rect">
             <a:avLst/>

</xml_diff>